<commit_message>
Functionality added to remove vessels from the pipeline, multipurpose vessels used for GBF projects differentiated from AHTS vessels used for floating projects, plotting functions added, updated scenarios and results
</commit_message>
<xml_diff>
--- a/analysis/results/archive/optimal_scenarios/post_proc.pptx
+++ b/analysis/results/archive/optimal_scenarios/post_proc.pptx
@@ -3050,7 +3050,7 @@
         <p:spPr>
           <a:xfrm>
             <a:off x="0" y="566928"/>
-            <a:ext cx="12188952" cy="5395815"/>
+            <a:ext cx="12188952" cy="5345654"/>
           </a:xfrm>
           <a:prstGeom prst="rect">
             <a:avLst/>
@@ -3176,7 +3176,7 @@
         <p:spPr>
           <a:xfrm>
             <a:off x="0" y="566928"/>
-            <a:ext cx="12188952" cy="5091404"/>
+            <a:ext cx="12188952" cy="4984778"/>
           </a:xfrm>
           <a:prstGeom prst="rect">
             <a:avLst/>
@@ -3428,7 +3428,7 @@
         <p:spPr>
           <a:xfrm>
             <a:off x="0" y="566928"/>
-            <a:ext cx="3886200" cy="4932081"/>
+            <a:ext cx="3886200" cy="4918799"/>
           </a:xfrm>
           <a:prstGeom prst="rect">
             <a:avLst/>
@@ -3680,7 +3680,7 @@
         <p:spPr>
           <a:xfrm>
             <a:off x="0" y="566928"/>
-            <a:ext cx="3886200" cy="4932081"/>
+            <a:ext cx="3886200" cy="4905588"/>
           </a:xfrm>
           <a:prstGeom prst="rect">
             <a:avLst/>

</xml_diff>